<commit_message>
adding source for azure graphic
</commit_message>
<xml_diff>
--- a/asp.net-and-azure-cob2014.pptx
+++ b/asp.net-and-azure-cob2014.pptx
@@ -4318,7 +4318,7 @@
         </p:blipFill>
         <p:spPr>
           <a:xfrm>
-            <a:off x="3047736" y="213081"/>
+            <a:off x="3047736" y="0"/>
             <a:ext cx="6096528" cy="6431837"/>
           </a:xfrm>
           <a:prstGeom prst="rect">
@@ -4326,6 +4326,58 @@
           </a:prstGeom>
         </p:spPr>
       </p:pic>
+      <p:sp>
+        <p:nvSpPr>
+          <p:cNvPr id="2" name="TextBox 1"/>
+          <p:cNvSpPr txBox="1"/>
+          <p:nvPr/>
+        </p:nvSpPr>
+        <p:spPr>
+          <a:xfrm>
+            <a:off x="221673" y="6483925"/>
+            <a:ext cx="10871200" cy="369332"/>
+          </a:xfrm>
+          <a:prstGeom prst="rect">
+            <a:avLst/>
+          </a:prstGeom>
+          <a:noFill/>
+        </p:spPr>
+        <p:txBody>
+          <a:bodyPr wrap="square" rtlCol="0">
+            <a:spAutoFit/>
+          </a:bodyPr>
+          <a:lstStyle/>
+          <a:p>
+            <a:r>
+              <a:rPr lang="en-US" dirty="0" smtClean="0"/>
+              <a:t>Source: </a:t>
+            </a:r>
+            <a:r>
+              <a:rPr lang="en-US" dirty="0" smtClean="0">
+                <a:hlinkClick r:id="rId3"/>
+              </a:rPr>
+              <a:t>http</a:t>
+            </a:r>
+            <a:r>
+              <a:rPr lang="en-US">
+                <a:hlinkClick r:id="rId3"/>
+              </a:rPr>
+              <a:t>://</a:t>
+            </a:r>
+            <a:r>
+              <a:rPr lang="en-US" smtClean="0">
+                <a:hlinkClick r:id="rId3"/>
+              </a:rPr>
+              <a:t>msdn.microsoft.com/en-us/library/azure/dd163896.aspx</a:t>
+            </a:r>
+            <a:r>
+              <a:rPr lang="en-US" smtClean="0"/>
+              <a:t> </a:t>
+            </a:r>
+            <a:endParaRPr lang="en-US" dirty="0"/>
+          </a:p>
+        </p:txBody>
+      </p:sp>
     </p:spTree>
     <p:extLst>
       <p:ext uri="{BB962C8B-B14F-4D97-AF65-F5344CB8AC3E}">

</xml_diff>